<commit_message>
Prajwal Roll NO Edited
</commit_message>
<xml_diff>
--- a/Amazon_Reviews_BI_Project.pptx
+++ b/Amazon_Reviews_BI_Project.pptx
@@ -468,7 +468,7 @@
           <a:p>
             <a:fld id="{5BCAD085-E8A6-8845-BD4E-CB4CCA059FC4}" type="datetimeFigureOut">
               <a:rPr lang="en-US" smtClean="0"/>
-              <a:t>9/29/2025</a:t>
+              <a:t>10/11/2025</a:t>
             </a:fld>
             <a:endParaRPr lang="en-US"/>
           </a:p>
@@ -792,7 +792,7 @@
           <a:p>
             <a:fld id="{5BCAD085-E8A6-8845-BD4E-CB4CCA059FC4}" type="datetimeFigureOut">
               <a:rPr lang="en-US" smtClean="0"/>
-              <a:t>9/29/2025</a:t>
+              <a:t>10/11/2025</a:t>
             </a:fld>
             <a:endParaRPr lang="en-US"/>
           </a:p>
@@ -1040,7 +1040,7 @@
           <a:p>
             <a:fld id="{5BCAD085-E8A6-8845-BD4E-CB4CCA059FC4}" type="datetimeFigureOut">
               <a:rPr lang="en-US" smtClean="0"/>
-              <a:t>9/29/2025</a:t>
+              <a:t>10/11/2025</a:t>
             </a:fld>
             <a:endParaRPr lang="en-US"/>
           </a:p>
@@ -1379,7 +1379,7 @@
           <a:p>
             <a:fld id="{5BCAD085-E8A6-8845-BD4E-CB4CCA059FC4}" type="datetimeFigureOut">
               <a:rPr lang="en-US" smtClean="0"/>
-              <a:t>9/29/2025</a:t>
+              <a:t>10/11/2025</a:t>
             </a:fld>
             <a:endParaRPr lang="en-US"/>
           </a:p>
@@ -1726,7 +1726,7 @@
           <a:p>
             <a:fld id="{5BCAD085-E8A6-8845-BD4E-CB4CCA059FC4}" type="datetimeFigureOut">
               <a:rPr lang="en-US" smtClean="0"/>
-              <a:t>9/29/2025</a:t>
+              <a:t>10/11/2025</a:t>
             </a:fld>
             <a:endParaRPr lang="en-US"/>
           </a:p>
@@ -2100,7 +2100,7 @@
           <a:p>
             <a:fld id="{5BCAD085-E8A6-8845-BD4E-CB4CCA059FC4}" type="datetimeFigureOut">
               <a:rPr lang="en-US" smtClean="0"/>
-              <a:t>9/29/2025</a:t>
+              <a:t>10/11/2025</a:t>
             </a:fld>
             <a:endParaRPr lang="en-US"/>
           </a:p>
@@ -2570,7 +2570,7 @@
           <a:p>
             <a:fld id="{5BCAD085-E8A6-8845-BD4E-CB4CCA059FC4}" type="datetimeFigureOut">
               <a:rPr lang="en-US" smtClean="0"/>
-              <a:t>9/29/2025</a:t>
+              <a:t>10/11/2025</a:t>
             </a:fld>
             <a:endParaRPr lang="en-US"/>
           </a:p>
@@ -2780,7 +2780,7 @@
           <a:p>
             <a:fld id="{5BCAD085-E8A6-8845-BD4E-CB4CCA059FC4}" type="datetimeFigureOut">
               <a:rPr lang="en-US" smtClean="0"/>
-              <a:t>9/29/2025</a:t>
+              <a:t>10/11/2025</a:t>
             </a:fld>
             <a:endParaRPr lang="en-US"/>
           </a:p>
@@ -2991,7 +2991,7 @@
           <a:p>
             <a:fld id="{5BCAD085-E8A6-8845-BD4E-CB4CCA059FC4}" type="datetimeFigureOut">
               <a:rPr lang="en-US" smtClean="0"/>
-              <a:t>9/29/2025</a:t>
+              <a:t>10/11/2025</a:t>
             </a:fld>
             <a:endParaRPr lang="en-US"/>
           </a:p>
@@ -3223,7 +3223,7 @@
           <a:p>
             <a:fld id="{5BCAD085-E8A6-8845-BD4E-CB4CCA059FC4}" type="datetimeFigureOut">
               <a:rPr lang="en-US" smtClean="0"/>
-              <a:t>9/29/2025</a:t>
+              <a:t>10/11/2025</a:t>
             </a:fld>
             <a:endParaRPr lang="en-US"/>
           </a:p>
@@ -3471,7 +3471,7 @@
           <a:p>
             <a:fld id="{5BCAD085-E8A6-8845-BD4E-CB4CCA059FC4}" type="datetimeFigureOut">
               <a:rPr lang="en-US" smtClean="0"/>
-              <a:t>9/29/2025</a:t>
+              <a:t>10/11/2025</a:t>
             </a:fld>
             <a:endParaRPr lang="en-US"/>
           </a:p>
@@ -3774,7 +3774,7 @@
           <a:p>
             <a:fld id="{5BCAD085-E8A6-8845-BD4E-CB4CCA059FC4}" type="datetimeFigureOut">
               <a:rPr lang="en-US" smtClean="0"/>
-              <a:t>9/29/2025</a:t>
+              <a:t>10/11/2025</a:t>
             </a:fld>
             <a:endParaRPr lang="en-US"/>
           </a:p>
@@ -4156,7 +4156,7 @@
           <a:p>
             <a:fld id="{5BCAD085-E8A6-8845-BD4E-CB4CCA059FC4}" type="datetimeFigureOut">
               <a:rPr lang="en-US" smtClean="0"/>
-              <a:t>9/29/2025</a:t>
+              <a:t>10/11/2025</a:t>
             </a:fld>
             <a:endParaRPr lang="en-US"/>
           </a:p>
@@ -4310,7 +4310,7 @@
           <a:p>
             <a:fld id="{5BCAD085-E8A6-8845-BD4E-CB4CCA059FC4}" type="datetimeFigureOut">
               <a:rPr lang="en-US" smtClean="0"/>
-              <a:t>9/29/2025</a:t>
+              <a:t>10/11/2025</a:t>
             </a:fld>
             <a:endParaRPr lang="en-US"/>
           </a:p>
@@ -4436,7 +4436,7 @@
           <a:p>
             <a:fld id="{5BCAD085-E8A6-8845-BD4E-CB4CCA059FC4}" type="datetimeFigureOut">
               <a:rPr lang="en-US" smtClean="0"/>
-              <a:t>9/29/2025</a:t>
+              <a:t>10/11/2025</a:t>
             </a:fld>
             <a:endParaRPr lang="en-US"/>
           </a:p>
@@ -4691,7 +4691,7 @@
           <a:p>
             <a:fld id="{5BCAD085-E8A6-8845-BD4E-CB4CCA059FC4}" type="datetimeFigureOut">
               <a:rPr lang="en-US" smtClean="0"/>
-              <a:t>9/29/2025</a:t>
+              <a:t>10/11/2025</a:t>
             </a:fld>
             <a:endParaRPr lang="en-US"/>
           </a:p>
@@ -5005,7 +5005,7 @@
           <a:p>
             <a:fld id="{5BCAD085-E8A6-8845-BD4E-CB4CCA059FC4}" type="datetimeFigureOut">
               <a:rPr lang="en-US" smtClean="0"/>
-              <a:t>9/29/2025</a:t>
+              <a:t>10/11/2025</a:t>
             </a:fld>
             <a:endParaRPr lang="en-US"/>
           </a:p>
@@ -5356,7 +5356,7 @@
           <a:p>
             <a:fld id="{5BCAD085-E8A6-8845-BD4E-CB4CCA059FC4}" type="datetimeFigureOut">
               <a:rPr lang="en-US" smtClean="0"/>
-              <a:t>9/29/2025</a:t>
+              <a:t>10/11/2025</a:t>
             </a:fld>
             <a:endParaRPr lang="en-US"/>
           </a:p>
@@ -6705,12 +6705,20 @@
               <a:rPr lang="en-IN" sz="2800" dirty="0" smtClean="0"/>
               <a:t>122B1B124 		    Vedant Kale</a:t>
             </a:r>
+            <a:r>
+              <a:rPr lang="en-IN" sz="2800" smtClean="0"/>
+              <a:t/>
+            </a:r>
             <a:br>
+              <a:rPr lang="en-IN" sz="2800" smtClean="0"/>
+            </a:br>
+            <a:r>
+              <a:rPr lang="en-IN" sz="2800" smtClean="0"/>
+              <a:t>122B1B138  </a:t>
+            </a:r>
+            <a:r>
               <a:rPr lang="en-IN" sz="2800" dirty="0" smtClean="0"/>
-            </a:br>
-            <a:r>
-              <a:rPr lang="en-IN" sz="2800" dirty="0" smtClean="0"/>
-              <a:t>122B1B139  		    </a:t>
+              <a:t>		    </a:t>
             </a:r>
             <a:r>
               <a:rPr lang="en-IN" sz="2800" dirty="0" err="1" smtClean="0"/>

</xml_diff>